<commit_message>
new materials for html
</commit_message>
<xml_diff>
--- a/Documents/JAVASCRIPT PROGRAMMING FUNDAMENTALS.pptx
+++ b/Documents/JAVASCRIPT PROGRAMMING FUNDAMENTALS.pptx
@@ -294,7 +294,7 @@
           <a:p>
             <a:fld id="{02AC24A9-CCB6-4F8D-B8DB-C2F3692CFA5A}" type="datetimeFigureOut">
               <a:rPr lang="en-US" smtClean="0"/>
-              <a:t>11/14/2020</a:t>
+              <a:t>11/18/2020</a:t>
             </a:fld>
             <a:endParaRPr lang="en-US" dirty="0"/>
           </a:p>
@@ -664,7 +664,7 @@
           <a:p>
             <a:fld id="{02AC24A9-CCB6-4F8D-B8DB-C2F3692CFA5A}" type="datetimeFigureOut">
               <a:rPr lang="en-US" smtClean="0"/>
-              <a:t>11/14/2020</a:t>
+              <a:t>11/18/2020</a:t>
             </a:fld>
             <a:endParaRPr lang="en-US"/>
           </a:p>
@@ -873,7 +873,7 @@
           <a:p>
             <a:fld id="{02AC24A9-CCB6-4F8D-B8DB-C2F3692CFA5A}" type="datetimeFigureOut">
               <a:rPr lang="en-US" smtClean="0"/>
-              <a:t>11/14/2020</a:t>
+              <a:t>11/18/2020</a:t>
             </a:fld>
             <a:endParaRPr lang="en-US"/>
           </a:p>
@@ -1343,7 +1343,7 @@
           <a:p>
             <a:fld id="{02AC24A9-CCB6-4F8D-B8DB-C2F3692CFA5A}" type="datetimeFigureOut">
               <a:rPr lang="en-US" smtClean="0"/>
-              <a:t>11/14/2020</a:t>
+              <a:t>11/18/2020</a:t>
             </a:fld>
             <a:endParaRPr lang="en-US"/>
           </a:p>
@@ -1797,7 +1797,7 @@
           <a:p>
             <a:fld id="{02AC24A9-CCB6-4F8D-B8DB-C2F3692CFA5A}" type="datetimeFigureOut">
               <a:rPr lang="en-US" smtClean="0"/>
-              <a:t>11/14/2020</a:t>
+              <a:t>11/18/2020</a:t>
             </a:fld>
             <a:endParaRPr lang="en-US"/>
           </a:p>
@@ -2329,7 +2329,7 @@
           <a:p>
             <a:fld id="{02AC24A9-CCB6-4F8D-B8DB-C2F3692CFA5A}" type="datetimeFigureOut">
               <a:rPr lang="en-US" smtClean="0"/>
-              <a:t>11/14/2020</a:t>
+              <a:t>11/18/2020</a:t>
             </a:fld>
             <a:endParaRPr lang="en-US"/>
           </a:p>
@@ -3028,7 +3028,7 @@
           <a:p>
             <a:fld id="{02AC24A9-CCB6-4F8D-B8DB-C2F3692CFA5A}" type="datetimeFigureOut">
               <a:rPr lang="en-US" smtClean="0"/>
-              <a:t>11/14/2020</a:t>
+              <a:t>11/18/2020</a:t>
             </a:fld>
             <a:endParaRPr lang="en-US"/>
           </a:p>
@@ -3357,7 +3357,7 @@
           <a:p>
             <a:fld id="{02AC24A9-CCB6-4F8D-B8DB-C2F3692CFA5A}" type="datetimeFigureOut">
               <a:rPr lang="en-US" smtClean="0"/>
-              <a:t>11/14/2020</a:t>
+              <a:t>11/18/2020</a:t>
             </a:fld>
             <a:endParaRPr lang="en-US"/>
           </a:p>
@@ -3470,7 +3470,7 @@
           <a:p>
             <a:fld id="{02AC24A9-CCB6-4F8D-B8DB-C2F3692CFA5A}" type="datetimeFigureOut">
               <a:rPr lang="en-US" smtClean="0"/>
-              <a:t>11/14/2020</a:t>
+              <a:t>11/18/2020</a:t>
             </a:fld>
             <a:endParaRPr lang="en-US"/>
           </a:p>
@@ -3965,7 +3965,7 @@
           <a:p>
             <a:fld id="{02AC24A9-CCB6-4F8D-B8DB-C2F3692CFA5A}" type="datetimeFigureOut">
               <a:rPr lang="en-US" smtClean="0"/>
-              <a:t>11/14/2020</a:t>
+              <a:t>11/18/2020</a:t>
             </a:fld>
             <a:endParaRPr lang="en-US" dirty="0"/>
           </a:p>
@@ -4442,7 +4442,7 @@
           <a:p>
             <a:fld id="{02AC24A9-CCB6-4F8D-B8DB-C2F3692CFA5A}" type="datetimeFigureOut">
               <a:rPr lang="en-US" smtClean="0"/>
-              <a:t>11/14/2020</a:t>
+              <a:t>11/18/2020</a:t>
             </a:fld>
             <a:endParaRPr lang="en-US"/>
           </a:p>
@@ -4685,7 +4685,7 @@
           <a:p>
             <a:fld id="{02AC24A9-CCB6-4F8D-B8DB-C2F3692CFA5A}" type="datetimeFigureOut">
               <a:rPr lang="en-US" smtClean="0"/>
-              <a:t>11/14/2020</a:t>
+              <a:t>11/18/2020</a:t>
             </a:fld>
             <a:endParaRPr lang="en-US"/>
           </a:p>
@@ -20566,7 +20566,7 @@
         <p:spPr>
           <a:xfrm>
             <a:off x="1458467" y="2355435"/>
-            <a:ext cx="3728906" cy="369332"/>
+            <a:ext cx="3510898" cy="369332"/>
           </a:xfrm>
           <a:prstGeom prst="rect">
             <a:avLst/>
@@ -20585,7 +20585,7 @@
                   <a:srgbClr val="00B0F0"/>
                 </a:solidFill>
               </a:rPr>
-              <a:t>cons</a:t>
+              <a:t>const</a:t>
             </a:r>
             <a:r>
               <a:rPr lang="en-US">
@@ -21018,7 +21018,7 @@
             </a:pPr>
             <a:r>
               <a:rPr lang="en-US" sz="1000"/>
-              <a:t>LOGICAL OPERATORS : comparing between data or variables</a:t>
+              <a:t>LOGICAL OPERATORS : an instruction to comparing between data or variables</a:t>
             </a:r>
           </a:p>
           <a:p>
@@ -21510,8 +21510,8 @@
         </p:nvSpPr>
         <p:spPr>
           <a:xfrm>
-            <a:off x="1115568" y="2147302"/>
-            <a:ext cx="7831879" cy="4162058"/>
+            <a:off x="1115568" y="2147301"/>
+            <a:ext cx="7831879" cy="4472439"/>
           </a:xfrm>
         </p:spPr>
         <p:txBody>

</xml_diff>